<commit_message>
Update AT04 Video Game History By Richard Pountney.pptx
</commit_message>
<xml_diff>
--- a/Informational Technology (Game Design)/Part 1 Redo/Cluster - Introduction to Game Design/AT04/AT04 Video Game History By Richard Pountney.pptx
+++ b/Informational Technology (Game Design)/Part 1 Redo/Cluster - Introduction to Game Design/AT04/AT04 Video Game History By Richard Pountney.pptx
@@ -6,6 +6,11 @@
   </p:sldMasterIdLst>
   <p:sldIdLst>
     <p:sldId id="256" r:id="rId2"/>
+    <p:sldId id="257" r:id="rId3"/>
+    <p:sldId id="258" r:id="rId4"/>
+    <p:sldId id="259" r:id="rId5"/>
+    <p:sldId id="260" r:id="rId6"/>
+    <p:sldId id="261" r:id="rId7"/>
   </p:sldIdLst>
   <p:sldSz cx="12192000" cy="6858000"/>
   <p:notesSz cx="6858000" cy="9144000"/>
@@ -104,6 +109,11 @@
       </a:defRPr>
     </a:lvl9pPr>
   </p:defaultTextStyle>
+  <p:extLst>
+    <p:ext uri="{EFAFB233-063F-42B5-8137-9DF3F51BA10A}">
+      <p15:sldGuideLst xmlns:p15="http://schemas.microsoft.com/office/powerpoint/2012/main"/>
+    </p:ext>
+  </p:extLst>
 </p:presentation>
 </file>
 
@@ -157,7 +167,7 @@
           <a:noFill/>
           <a:extLst>
             <a:ext uri="{909E8E84-426E-40dd-AFC4-6F175D3DCCD1}">
-              <a14:hiddenFill xmlns:a14="http://schemas.microsoft.com/office/drawing/2010/main" xmlns="">
+              <a14:hiddenFill xmlns="" xmlns:a14="http://schemas.microsoft.com/office/drawing/2010/main">
                 <a:solidFill>
                   <a:srgbClr val="FFFFFF"/>
                 </a:solidFill>
@@ -217,7 +227,7 @@
             </a:ln>
             <a:extLst>
               <a:ext uri="{91240B29-F687-4f45-9708-019B960494DF}">
-                <a14:hiddenLine xmlns:a14="http://schemas.microsoft.com/office/drawing/2010/main" xmlns="" w="9525">
+                <a14:hiddenLine xmlns="" xmlns:a14="http://schemas.microsoft.com/office/drawing/2010/main" w="9525">
                   <a:solidFill>
                     <a:srgbClr val="000000"/>
                   </a:solidFill>
@@ -307,7 +317,7 @@
             </a:ln>
             <a:extLst>
               <a:ext uri="{91240B29-F687-4f45-9708-019B960494DF}">
-                <a14:hiddenLine xmlns:a14="http://schemas.microsoft.com/office/drawing/2010/main" xmlns="" w="9525">
+                <a14:hiddenLine xmlns="" xmlns:a14="http://schemas.microsoft.com/office/drawing/2010/main" w="9525">
                   <a:solidFill>
                     <a:srgbClr val="000000"/>
                   </a:solidFill>
@@ -397,7 +407,7 @@
             </a:ln>
             <a:extLst>
               <a:ext uri="{91240B29-F687-4f45-9708-019B960494DF}">
-                <a14:hiddenLine xmlns:a14="http://schemas.microsoft.com/office/drawing/2010/main" xmlns="" w="9525">
+                <a14:hiddenLine xmlns="" xmlns:a14="http://schemas.microsoft.com/office/drawing/2010/main" w="9525">
                   <a:solidFill>
                     <a:srgbClr val="000000"/>
                   </a:solidFill>
@@ -431,7 +441,7 @@
             </a:ln>
             <a:extLst>
               <a:ext uri="{91240B29-F687-4f45-9708-019B960494DF}">
-                <a14:hiddenLine xmlns:a14="http://schemas.microsoft.com/office/drawing/2010/main" xmlns="" w="9525">
+                <a14:hiddenLine xmlns="" xmlns:a14="http://schemas.microsoft.com/office/drawing/2010/main" w="9525">
                   <a:solidFill>
                     <a:srgbClr val="000000"/>
                   </a:solidFill>
@@ -521,7 +531,7 @@
             </a:ln>
             <a:extLst>
               <a:ext uri="{91240B29-F687-4f45-9708-019B960494DF}">
-                <a14:hiddenLine xmlns:a14="http://schemas.microsoft.com/office/drawing/2010/main" xmlns="" w="9525">
+                <a14:hiddenLine xmlns="" xmlns:a14="http://schemas.microsoft.com/office/drawing/2010/main" w="9525">
                   <a:solidFill>
                     <a:srgbClr val="000000"/>
                   </a:solidFill>
@@ -583,7 +593,7 @@
             </a:ln>
             <a:extLst>
               <a:ext uri="{91240B29-F687-4f45-9708-019B960494DF}">
-                <a14:hiddenLine xmlns:a14="http://schemas.microsoft.com/office/drawing/2010/main" xmlns="" w="9525">
+                <a14:hiddenLine xmlns="" xmlns:a14="http://schemas.microsoft.com/office/drawing/2010/main" w="9525">
                   <a:solidFill>
                     <a:srgbClr val="000000"/>
                   </a:solidFill>
@@ -645,7 +655,7 @@
             </a:ln>
             <a:extLst>
               <a:ext uri="{91240B29-F687-4f45-9708-019B960494DF}">
-                <a14:hiddenLine xmlns:a14="http://schemas.microsoft.com/office/drawing/2010/main" xmlns="" w="9525">
+                <a14:hiddenLine xmlns="" xmlns:a14="http://schemas.microsoft.com/office/drawing/2010/main" w="9525">
                   <a:solidFill>
                     <a:srgbClr val="000000"/>
                   </a:solidFill>
@@ -735,7 +745,7 @@
             </a:ln>
             <a:extLst>
               <a:ext uri="{91240B29-F687-4f45-9708-019B960494DF}">
-                <a14:hiddenLine xmlns:a14="http://schemas.microsoft.com/office/drawing/2010/main" xmlns="" w="9525">
+                <a14:hiddenLine xmlns="" xmlns:a14="http://schemas.microsoft.com/office/drawing/2010/main" w="9525">
                   <a:solidFill>
                     <a:srgbClr val="000000"/>
                   </a:solidFill>
@@ -797,7 +807,7 @@
             </a:ln>
             <a:extLst>
               <a:ext uri="{91240B29-F687-4f45-9708-019B960494DF}">
-                <a14:hiddenLine xmlns:a14="http://schemas.microsoft.com/office/drawing/2010/main" xmlns="" w="9525">
+                <a14:hiddenLine xmlns="" xmlns:a14="http://schemas.microsoft.com/office/drawing/2010/main" w="9525">
                   <a:solidFill>
                     <a:srgbClr val="000000"/>
                   </a:solidFill>
@@ -859,7 +869,7 @@
             </a:ln>
             <a:extLst>
               <a:ext uri="{91240B29-F687-4f45-9708-019B960494DF}">
-                <a14:hiddenLine xmlns:a14="http://schemas.microsoft.com/office/drawing/2010/main" xmlns="" w="9525">
+                <a14:hiddenLine xmlns="" xmlns:a14="http://schemas.microsoft.com/office/drawing/2010/main" w="9525">
                   <a:solidFill>
                     <a:srgbClr val="000000"/>
                   </a:solidFill>
@@ -949,7 +959,7 @@
             </a:ln>
             <a:extLst>
               <a:ext uri="{91240B29-F687-4f45-9708-019B960494DF}">
-                <a14:hiddenLine xmlns:a14="http://schemas.microsoft.com/office/drawing/2010/main" xmlns="" w="9525">
+                <a14:hiddenLine xmlns="" xmlns:a14="http://schemas.microsoft.com/office/drawing/2010/main" w="9525">
                   <a:solidFill>
                     <a:srgbClr val="000000"/>
                   </a:solidFill>
@@ -1039,7 +1049,7 @@
             </a:ln>
             <a:extLst>
               <a:ext uri="{91240B29-F687-4f45-9708-019B960494DF}">
-                <a14:hiddenLine xmlns:a14="http://schemas.microsoft.com/office/drawing/2010/main" xmlns="" w="9525">
+                <a14:hiddenLine xmlns="" xmlns:a14="http://schemas.microsoft.com/office/drawing/2010/main" w="9525">
                   <a:solidFill>
                     <a:srgbClr val="000000"/>
                   </a:solidFill>
@@ -1101,7 +1111,7 @@
             </a:ln>
             <a:extLst>
               <a:ext uri="{91240B29-F687-4f45-9708-019B960494DF}">
-                <a14:hiddenLine xmlns:a14="http://schemas.microsoft.com/office/drawing/2010/main" xmlns="" w="9525">
+                <a14:hiddenLine xmlns="" xmlns:a14="http://schemas.microsoft.com/office/drawing/2010/main" w="9525">
                   <a:solidFill>
                     <a:srgbClr val="000000"/>
                   </a:solidFill>
@@ -1211,7 +1221,7 @@
             </a:ln>
             <a:extLst>
               <a:ext uri="{91240B29-F687-4f45-9708-019B960494DF}">
-                <a14:hiddenLine xmlns:a14="http://schemas.microsoft.com/office/drawing/2010/main" xmlns="" w="9525">
+                <a14:hiddenLine xmlns="" xmlns:a14="http://schemas.microsoft.com/office/drawing/2010/main" w="9525">
                   <a:solidFill>
                     <a:srgbClr val="000000"/>
                   </a:solidFill>
@@ -1273,7 +1283,7 @@
             </a:ln>
             <a:extLst>
               <a:ext uri="{91240B29-F687-4f45-9708-019B960494DF}">
-                <a14:hiddenLine xmlns:a14="http://schemas.microsoft.com/office/drawing/2010/main" xmlns="" w="9525">
+                <a14:hiddenLine xmlns="" xmlns:a14="http://schemas.microsoft.com/office/drawing/2010/main" w="9525">
                   <a:solidFill>
                     <a:srgbClr val="000000"/>
                   </a:solidFill>
@@ -1363,7 +1373,7 @@
             </a:ln>
             <a:extLst>
               <a:ext uri="{91240B29-F687-4f45-9708-019B960494DF}">
-                <a14:hiddenLine xmlns:a14="http://schemas.microsoft.com/office/drawing/2010/main" xmlns="" w="9525">
+                <a14:hiddenLine xmlns="" xmlns:a14="http://schemas.microsoft.com/office/drawing/2010/main" w="9525">
                   <a:solidFill>
                     <a:srgbClr val="000000"/>
                   </a:solidFill>
@@ -1453,7 +1463,7 @@
             </a:ln>
             <a:extLst>
               <a:ext uri="{91240B29-F687-4f45-9708-019B960494DF}">
-                <a14:hiddenLine xmlns:a14="http://schemas.microsoft.com/office/drawing/2010/main" xmlns="" w="9525">
+                <a14:hiddenLine xmlns="" xmlns:a14="http://schemas.microsoft.com/office/drawing/2010/main" w="9525">
                   <a:solidFill>
                     <a:srgbClr val="000000"/>
                   </a:solidFill>
@@ -1515,7 +1525,7 @@
             </a:ln>
             <a:extLst>
               <a:ext uri="{91240B29-F687-4f45-9708-019B960494DF}">
-                <a14:hiddenLine xmlns:a14="http://schemas.microsoft.com/office/drawing/2010/main" xmlns="" w="9525">
+                <a14:hiddenLine xmlns="" xmlns:a14="http://schemas.microsoft.com/office/drawing/2010/main" w="9525">
                   <a:solidFill>
                     <a:srgbClr val="000000"/>
                   </a:solidFill>
@@ -1605,7 +1615,7 @@
             </a:ln>
             <a:extLst>
               <a:ext uri="{91240B29-F687-4f45-9708-019B960494DF}">
-                <a14:hiddenLine xmlns:a14="http://schemas.microsoft.com/office/drawing/2010/main" xmlns="" w="9525">
+                <a14:hiddenLine xmlns="" xmlns:a14="http://schemas.microsoft.com/office/drawing/2010/main" w="9525">
                   <a:solidFill>
                     <a:srgbClr val="000000"/>
                   </a:solidFill>
@@ -1695,7 +1705,7 @@
             </a:ln>
             <a:extLst>
               <a:ext uri="{91240B29-F687-4f45-9708-019B960494DF}">
-                <a14:hiddenLine xmlns:a14="http://schemas.microsoft.com/office/drawing/2010/main" xmlns="" w="9525">
+                <a14:hiddenLine xmlns="" xmlns:a14="http://schemas.microsoft.com/office/drawing/2010/main" w="9525">
                   <a:solidFill>
                     <a:srgbClr val="000000"/>
                   </a:solidFill>
@@ -1751,7 +1761,7 @@
             </a:ln>
             <a:extLst>
               <a:ext uri="{91240B29-F687-4f45-9708-019B960494DF}">
-                <a14:hiddenLine xmlns:a14="http://schemas.microsoft.com/office/drawing/2010/main" xmlns="" w="9525">
+                <a14:hiddenLine xmlns="" xmlns:a14="http://schemas.microsoft.com/office/drawing/2010/main" w="9525">
                   <a:solidFill>
                     <a:srgbClr val="000000"/>
                   </a:solidFill>
@@ -1841,7 +1851,7 @@
             </a:ln>
             <a:extLst>
               <a:ext uri="{91240B29-F687-4f45-9708-019B960494DF}">
-                <a14:hiddenLine xmlns:a14="http://schemas.microsoft.com/office/drawing/2010/main" xmlns="" w="9525">
+                <a14:hiddenLine xmlns="" xmlns:a14="http://schemas.microsoft.com/office/drawing/2010/main" w="9525">
                   <a:solidFill>
                     <a:srgbClr val="000000"/>
                   </a:solidFill>
@@ -1897,7 +1907,7 @@
             </a:ln>
             <a:extLst>
               <a:ext uri="{91240B29-F687-4f45-9708-019B960494DF}">
-                <a14:hiddenLine xmlns:a14="http://schemas.microsoft.com/office/drawing/2010/main" xmlns="" w="9525">
+                <a14:hiddenLine xmlns="" xmlns:a14="http://schemas.microsoft.com/office/drawing/2010/main" w="9525">
                   <a:solidFill>
                     <a:srgbClr val="000000"/>
                   </a:solidFill>
@@ -1987,7 +1997,7 @@
             </a:ln>
             <a:extLst>
               <a:ext uri="{91240B29-F687-4f45-9708-019B960494DF}">
-                <a14:hiddenLine xmlns:a14="http://schemas.microsoft.com/office/drawing/2010/main" xmlns="" w="9525">
+                <a14:hiddenLine xmlns="" xmlns:a14="http://schemas.microsoft.com/office/drawing/2010/main" w="9525">
                   <a:solidFill>
                     <a:srgbClr val="000000"/>
                   </a:solidFill>
@@ -2055,7 +2065,7 @@
             </a:ln>
             <a:extLst>
               <a:ext uri="{91240B29-F687-4f45-9708-019B960494DF}">
-                <a14:hiddenLine xmlns:a14="http://schemas.microsoft.com/office/drawing/2010/main" xmlns="" w="9525">
+                <a14:hiddenLine xmlns="" xmlns:a14="http://schemas.microsoft.com/office/drawing/2010/main" w="9525">
                   <a:solidFill>
                     <a:srgbClr val="000000"/>
                   </a:solidFill>
@@ -2145,7 +2155,7 @@
             </a:ln>
             <a:extLst>
               <a:ext uri="{91240B29-F687-4f45-9708-019B960494DF}">
-                <a14:hiddenLine xmlns:a14="http://schemas.microsoft.com/office/drawing/2010/main" xmlns="" w="9525">
+                <a14:hiddenLine xmlns="" xmlns:a14="http://schemas.microsoft.com/office/drawing/2010/main" w="9525">
                   <a:solidFill>
                     <a:srgbClr val="000000"/>
                   </a:solidFill>
@@ -2213,7 +2223,7 @@
             </a:ln>
             <a:extLst>
               <a:ext uri="{91240B29-F687-4f45-9708-019B960494DF}">
-                <a14:hiddenLine xmlns:a14="http://schemas.microsoft.com/office/drawing/2010/main" xmlns="" w="9525">
+                <a14:hiddenLine xmlns="" xmlns:a14="http://schemas.microsoft.com/office/drawing/2010/main" w="9525">
                   <a:solidFill>
                     <a:srgbClr val="000000"/>
                   </a:solidFill>
@@ -2303,7 +2313,7 @@
             </a:ln>
             <a:extLst>
               <a:ext uri="{91240B29-F687-4f45-9708-019B960494DF}">
-                <a14:hiddenLine xmlns:a14="http://schemas.microsoft.com/office/drawing/2010/main" xmlns="" w="9525">
+                <a14:hiddenLine xmlns="" xmlns:a14="http://schemas.microsoft.com/office/drawing/2010/main" w="9525">
                   <a:solidFill>
                     <a:srgbClr val="000000"/>
                   </a:solidFill>
@@ -2337,7 +2347,7 @@
             </a:ln>
             <a:extLst>
               <a:ext uri="{91240B29-F687-4f45-9708-019B960494DF}">
-                <a14:hiddenLine xmlns:a14="http://schemas.microsoft.com/office/drawing/2010/main" xmlns="" w="9525">
+                <a14:hiddenLine xmlns="" xmlns:a14="http://schemas.microsoft.com/office/drawing/2010/main" w="9525">
                   <a:solidFill>
                     <a:srgbClr val="000000"/>
                   </a:solidFill>
@@ -2427,7 +2437,7 @@
             </a:ln>
             <a:extLst>
               <a:ext uri="{91240B29-F687-4f45-9708-019B960494DF}">
-                <a14:hiddenLine xmlns:a14="http://schemas.microsoft.com/office/drawing/2010/main" xmlns="" w="9525">
+                <a14:hiddenLine xmlns="" xmlns:a14="http://schemas.microsoft.com/office/drawing/2010/main" w="9525">
                   <a:solidFill>
                     <a:srgbClr val="000000"/>
                   </a:solidFill>
@@ -2489,7 +2499,7 @@
             </a:ln>
             <a:extLst>
               <a:ext uri="{91240B29-F687-4f45-9708-019B960494DF}">
-                <a14:hiddenLine xmlns:a14="http://schemas.microsoft.com/office/drawing/2010/main" xmlns="" w="9525">
+                <a14:hiddenLine xmlns="" xmlns:a14="http://schemas.microsoft.com/office/drawing/2010/main" w="9525">
                   <a:solidFill>
                     <a:srgbClr val="000000"/>
                   </a:solidFill>
@@ -2551,7 +2561,7 @@
             </a:ln>
             <a:extLst>
               <a:ext uri="{91240B29-F687-4f45-9708-019B960494DF}">
-                <a14:hiddenLine xmlns:a14="http://schemas.microsoft.com/office/drawing/2010/main" xmlns="" w="9525">
+                <a14:hiddenLine xmlns="" xmlns:a14="http://schemas.microsoft.com/office/drawing/2010/main" w="9525">
                   <a:solidFill>
                     <a:srgbClr val="000000"/>
                   </a:solidFill>
@@ -2641,7 +2651,7 @@
             </a:ln>
             <a:extLst>
               <a:ext uri="{91240B29-F687-4f45-9708-019B960494DF}">
-                <a14:hiddenLine xmlns:a14="http://schemas.microsoft.com/office/drawing/2010/main" xmlns="" w="9525">
+                <a14:hiddenLine xmlns="" xmlns:a14="http://schemas.microsoft.com/office/drawing/2010/main" w="9525">
                   <a:solidFill>
                     <a:srgbClr val="000000"/>
                   </a:solidFill>
@@ -2709,7 +2719,7 @@
             </a:ln>
             <a:extLst>
               <a:ext uri="{91240B29-F687-4f45-9708-019B960494DF}">
-                <a14:hiddenLine xmlns:a14="http://schemas.microsoft.com/office/drawing/2010/main" xmlns="" w="9525">
+                <a14:hiddenLine xmlns="" xmlns:a14="http://schemas.microsoft.com/office/drawing/2010/main" w="9525">
                   <a:solidFill>
                     <a:srgbClr val="000000"/>
                   </a:solidFill>
@@ -2771,7 +2781,7 @@
             </a:ln>
             <a:extLst>
               <a:ext uri="{91240B29-F687-4f45-9708-019B960494DF}">
-                <a14:hiddenLine xmlns:a14="http://schemas.microsoft.com/office/drawing/2010/main" xmlns="" w="9525">
+                <a14:hiddenLine xmlns="" xmlns:a14="http://schemas.microsoft.com/office/drawing/2010/main" w="9525">
                   <a:solidFill>
                     <a:srgbClr val="000000"/>
                   </a:solidFill>
@@ -2861,7 +2871,7 @@
             </a:ln>
             <a:extLst>
               <a:ext uri="{91240B29-F687-4f45-9708-019B960494DF}">
-                <a14:hiddenLine xmlns:a14="http://schemas.microsoft.com/office/drawing/2010/main" xmlns="" w="9525">
+                <a14:hiddenLine xmlns="" xmlns:a14="http://schemas.microsoft.com/office/drawing/2010/main" w="9525">
                   <a:solidFill>
                     <a:srgbClr val="000000"/>
                   </a:solidFill>
@@ -2923,7 +2933,7 @@
             </a:ln>
             <a:extLst>
               <a:ext uri="{91240B29-F687-4f45-9708-019B960494DF}">
-                <a14:hiddenLine xmlns:a14="http://schemas.microsoft.com/office/drawing/2010/main" xmlns="" w="9525">
+                <a14:hiddenLine xmlns="" xmlns:a14="http://schemas.microsoft.com/office/drawing/2010/main" w="9525">
                   <a:solidFill>
                     <a:srgbClr val="000000"/>
                   </a:solidFill>
@@ -3013,7 +3023,7 @@
             </a:ln>
             <a:extLst>
               <a:ext uri="{91240B29-F687-4f45-9708-019B960494DF}">
-                <a14:hiddenLine xmlns:a14="http://schemas.microsoft.com/office/drawing/2010/main" xmlns="" w="9525">
+                <a14:hiddenLine xmlns="" xmlns:a14="http://schemas.microsoft.com/office/drawing/2010/main" w="9525">
                   <a:solidFill>
                     <a:srgbClr val="000000"/>
                   </a:solidFill>
@@ -3075,7 +3085,7 @@
             </a:ln>
             <a:extLst>
               <a:ext uri="{91240B29-F687-4f45-9708-019B960494DF}">
-                <a14:hiddenLine xmlns:a14="http://schemas.microsoft.com/office/drawing/2010/main" xmlns="" w="9525">
+                <a14:hiddenLine xmlns="" xmlns:a14="http://schemas.microsoft.com/office/drawing/2010/main" w="9525">
                   <a:solidFill>
                     <a:srgbClr val="000000"/>
                   </a:solidFill>
@@ -3165,7 +3175,7 @@
             </a:ln>
             <a:extLst>
               <a:ext uri="{91240B29-F687-4f45-9708-019B960494DF}">
-                <a14:hiddenLine xmlns:a14="http://schemas.microsoft.com/office/drawing/2010/main" xmlns="" w="9525">
+                <a14:hiddenLine xmlns="" xmlns:a14="http://schemas.microsoft.com/office/drawing/2010/main" w="9525">
                   <a:solidFill>
                     <a:srgbClr val="000000"/>
                   </a:solidFill>
@@ -3199,7 +3209,7 @@
             </a:ln>
             <a:extLst>
               <a:ext uri="{91240B29-F687-4f45-9708-019B960494DF}">
-                <a14:hiddenLine xmlns:a14="http://schemas.microsoft.com/office/drawing/2010/main" xmlns="" w="9525">
+                <a14:hiddenLine xmlns="" xmlns:a14="http://schemas.microsoft.com/office/drawing/2010/main" w="9525">
                   <a:solidFill>
                     <a:srgbClr val="000000"/>
                   </a:solidFill>
@@ -3264,7 +3274,7 @@
             </a:ln>
             <a:extLst>
               <a:ext uri="{91240B29-F687-4f45-9708-019B960494DF}">
-                <a14:hiddenLine xmlns:a14="http://schemas.microsoft.com/office/drawing/2010/main" xmlns="" w="9525">
+                <a14:hiddenLine xmlns="" xmlns:a14="http://schemas.microsoft.com/office/drawing/2010/main" w="9525">
                   <a:solidFill>
                     <a:srgbClr val="000000"/>
                   </a:solidFill>
@@ -3354,7 +3364,7 @@
             </a:ln>
             <a:extLst>
               <a:ext uri="{91240B29-F687-4f45-9708-019B960494DF}">
-                <a14:hiddenLine xmlns:a14="http://schemas.microsoft.com/office/drawing/2010/main" xmlns="" w="9525">
+                <a14:hiddenLine xmlns="" xmlns:a14="http://schemas.microsoft.com/office/drawing/2010/main" w="9525">
                   <a:solidFill>
                     <a:srgbClr val="000000"/>
                   </a:solidFill>
@@ -3416,7 +3426,7 @@
             </a:ln>
             <a:extLst>
               <a:ext uri="{91240B29-F687-4f45-9708-019B960494DF}">
-                <a14:hiddenLine xmlns:a14="http://schemas.microsoft.com/office/drawing/2010/main" xmlns="" w="9525">
+                <a14:hiddenLine xmlns="" xmlns:a14="http://schemas.microsoft.com/office/drawing/2010/main" w="9525">
                   <a:solidFill>
                     <a:srgbClr val="000000"/>
                   </a:solidFill>
@@ -3506,7 +3516,7 @@
             </a:ln>
             <a:extLst>
               <a:ext uri="{91240B29-F687-4f45-9708-019B960494DF}">
-                <a14:hiddenLine xmlns:a14="http://schemas.microsoft.com/office/drawing/2010/main" xmlns="" w="9525">
+                <a14:hiddenLine xmlns="" xmlns:a14="http://schemas.microsoft.com/office/drawing/2010/main" w="9525">
                   <a:solidFill>
                     <a:srgbClr val="000000"/>
                   </a:solidFill>
@@ -3596,7 +3606,7 @@
             </a:ln>
             <a:extLst>
               <a:ext uri="{91240B29-F687-4f45-9708-019B960494DF}">
-                <a14:hiddenLine xmlns:a14="http://schemas.microsoft.com/office/drawing/2010/main" xmlns="" w="9525">
+                <a14:hiddenLine xmlns="" xmlns:a14="http://schemas.microsoft.com/office/drawing/2010/main" w="9525">
                   <a:solidFill>
                     <a:srgbClr val="000000"/>
                   </a:solidFill>
@@ -3661,7 +3671,7 @@
             </a:ln>
             <a:extLst>
               <a:ext uri="{91240B29-F687-4f45-9708-019B960494DF}">
-                <a14:hiddenLine xmlns:a14="http://schemas.microsoft.com/office/drawing/2010/main" xmlns="" w="9525">
+                <a14:hiddenLine xmlns="" xmlns:a14="http://schemas.microsoft.com/office/drawing/2010/main" w="9525">
                   <a:solidFill>
                     <a:srgbClr val="000000"/>
                   </a:solidFill>
@@ -3723,7 +3733,7 @@
             </a:ln>
             <a:extLst>
               <a:ext uri="{91240B29-F687-4f45-9708-019B960494DF}">
-                <a14:hiddenLine xmlns:a14="http://schemas.microsoft.com/office/drawing/2010/main" xmlns="" w="9525">
+                <a14:hiddenLine xmlns="" xmlns:a14="http://schemas.microsoft.com/office/drawing/2010/main" w="9525">
                   <a:solidFill>
                     <a:srgbClr val="000000"/>
                   </a:solidFill>
@@ -3813,7 +3823,7 @@
             </a:ln>
             <a:extLst>
               <a:ext uri="{91240B29-F687-4f45-9708-019B960494DF}">
-                <a14:hiddenLine xmlns:a14="http://schemas.microsoft.com/office/drawing/2010/main" xmlns="" w="9525">
+                <a14:hiddenLine xmlns="" xmlns:a14="http://schemas.microsoft.com/office/drawing/2010/main" w="9525">
                   <a:solidFill>
                     <a:srgbClr val="000000"/>
                   </a:solidFill>
@@ -3903,7 +3913,7 @@
             </a:ln>
             <a:extLst>
               <a:ext uri="{91240B29-F687-4f45-9708-019B960494DF}">
-                <a14:hiddenLine xmlns:a14="http://schemas.microsoft.com/office/drawing/2010/main" xmlns="" w="9525">
+                <a14:hiddenLine xmlns="" xmlns:a14="http://schemas.microsoft.com/office/drawing/2010/main" w="9525">
                   <a:solidFill>
                     <a:srgbClr val="000000"/>
                   </a:solidFill>
@@ -3965,7 +3975,7 @@
             </a:ln>
             <a:extLst>
               <a:ext uri="{91240B29-F687-4f45-9708-019B960494DF}">
-                <a14:hiddenLine xmlns:a14="http://schemas.microsoft.com/office/drawing/2010/main" xmlns="" w="9525">
+                <a14:hiddenLine xmlns="" xmlns:a14="http://schemas.microsoft.com/office/drawing/2010/main" w="9525">
                   <a:solidFill>
                     <a:srgbClr val="000000"/>
                   </a:solidFill>
@@ -4085,7 +4095,7 @@
             </a:ln>
             <a:extLst>
               <a:ext uri="{91240B29-F687-4f45-9708-019B960494DF}">
-                <a14:hiddenLine xmlns:a14="http://schemas.microsoft.com/office/drawing/2010/main" xmlns="" w="9525">
+                <a14:hiddenLine xmlns="" xmlns:a14="http://schemas.microsoft.com/office/drawing/2010/main" w="9525">
                   <a:solidFill>
                     <a:srgbClr val="000000"/>
                   </a:solidFill>
@@ -4153,7 +4163,7 @@
             </a:ln>
             <a:extLst>
               <a:ext uri="{91240B29-F687-4f45-9708-019B960494DF}">
-                <a14:hiddenLine xmlns:a14="http://schemas.microsoft.com/office/drawing/2010/main" xmlns="" w="9525">
+                <a14:hiddenLine xmlns="" xmlns:a14="http://schemas.microsoft.com/office/drawing/2010/main" w="9525">
                   <a:solidFill>
                     <a:srgbClr val="000000"/>
                   </a:solidFill>
@@ -4243,7 +4253,7 @@
             </a:ln>
             <a:extLst>
               <a:ext uri="{91240B29-F687-4f45-9708-019B960494DF}">
-                <a14:hiddenLine xmlns:a14="http://schemas.microsoft.com/office/drawing/2010/main" xmlns="" w="9525">
+                <a14:hiddenLine xmlns="" xmlns:a14="http://schemas.microsoft.com/office/drawing/2010/main" w="9525">
                   <a:solidFill>
                     <a:srgbClr val="000000"/>
                   </a:solidFill>
@@ -4383,7 +4393,7 @@
           <a:p>
             <a:fld id="{AFC0772B-B1F5-4297-B0F2-E59C48C63404}" type="datetimeFigureOut">
               <a:rPr lang="en-AU" smtClean="0"/>
-              <a:t>11/07/2023</a:t>
+              <a:t>2/08/2023</a:t>
             </a:fld>
             <a:endParaRPr lang="en-AU"/>
           </a:p>
@@ -4650,7 +4660,7 @@
           <a:p>
             <a:fld id="{AFC0772B-B1F5-4297-B0F2-E59C48C63404}" type="datetimeFigureOut">
               <a:rPr lang="en-AU" smtClean="0"/>
-              <a:t>11/07/2023</a:t>
+              <a:t>2/08/2023</a:t>
             </a:fld>
             <a:endParaRPr lang="en-AU"/>
           </a:p>
@@ -4846,7 +4856,7 @@
           <a:p>
             <a:fld id="{AFC0772B-B1F5-4297-B0F2-E59C48C63404}" type="datetimeFigureOut">
               <a:rPr lang="en-AU" smtClean="0"/>
-              <a:t>11/07/2023</a:t>
+              <a:t>2/08/2023</a:t>
             </a:fld>
             <a:endParaRPr lang="en-AU"/>
           </a:p>
@@ -5109,7 +5119,7 @@
           <a:p>
             <a:fld id="{AFC0772B-B1F5-4297-B0F2-E59C48C63404}" type="datetimeFigureOut">
               <a:rPr lang="en-AU" smtClean="0"/>
-              <a:t>11/07/2023</a:t>
+              <a:t>2/08/2023</a:t>
             </a:fld>
             <a:endParaRPr lang="en-AU"/>
           </a:p>
@@ -5543,7 +5553,7 @@
           <a:p>
             <a:fld id="{AFC0772B-B1F5-4297-B0F2-E59C48C63404}" type="datetimeFigureOut">
               <a:rPr lang="en-AU" smtClean="0"/>
-              <a:t>11/07/2023</a:t>
+              <a:t>2/08/2023</a:t>
             </a:fld>
             <a:endParaRPr lang="en-AU"/>
           </a:p>
@@ -6089,7 +6099,7 @@
           <a:p>
             <a:fld id="{AFC0772B-B1F5-4297-B0F2-E59C48C63404}" type="datetimeFigureOut">
               <a:rPr lang="en-AU" smtClean="0"/>
-              <a:t>11/07/2023</a:t>
+              <a:t>2/08/2023</a:t>
             </a:fld>
             <a:endParaRPr lang="en-AU"/>
           </a:p>
@@ -6809,7 +6819,7 @@
           <a:p>
             <a:fld id="{AFC0772B-B1F5-4297-B0F2-E59C48C63404}" type="datetimeFigureOut">
               <a:rPr lang="en-AU" smtClean="0"/>
-              <a:t>11/07/2023</a:t>
+              <a:t>2/08/2023</a:t>
             </a:fld>
             <a:endParaRPr lang="en-AU"/>
           </a:p>
@@ -6979,7 +6989,7 @@
           <a:p>
             <a:fld id="{AFC0772B-B1F5-4297-B0F2-E59C48C63404}" type="datetimeFigureOut">
               <a:rPr lang="en-AU" smtClean="0"/>
-              <a:t>11/07/2023</a:t>
+              <a:t>2/08/2023</a:t>
             </a:fld>
             <a:endParaRPr lang="en-AU"/>
           </a:p>
@@ -7159,7 +7169,7 @@
           <a:p>
             <a:fld id="{AFC0772B-B1F5-4297-B0F2-E59C48C63404}" type="datetimeFigureOut">
               <a:rPr lang="en-AU" smtClean="0"/>
-              <a:t>11/07/2023</a:t>
+              <a:t>2/08/2023</a:t>
             </a:fld>
             <a:endParaRPr lang="en-AU"/>
           </a:p>
@@ -7329,7 +7339,7 @@
           <a:p>
             <a:fld id="{AFC0772B-B1F5-4297-B0F2-E59C48C63404}" type="datetimeFigureOut">
               <a:rPr lang="en-AU" smtClean="0"/>
-              <a:t>11/07/2023</a:t>
+              <a:t>2/08/2023</a:t>
             </a:fld>
             <a:endParaRPr lang="en-AU"/>
           </a:p>
@@ -7579,7 +7589,7 @@
           <a:p>
             <a:fld id="{AFC0772B-B1F5-4297-B0F2-E59C48C63404}" type="datetimeFigureOut">
               <a:rPr lang="en-AU" smtClean="0"/>
-              <a:t>11/07/2023</a:t>
+              <a:t>2/08/2023</a:t>
             </a:fld>
             <a:endParaRPr lang="en-AU"/>
           </a:p>
@@ -7811,7 +7821,7 @@
           <a:p>
             <a:fld id="{AFC0772B-B1F5-4297-B0F2-E59C48C63404}" type="datetimeFigureOut">
               <a:rPr lang="en-AU" smtClean="0"/>
-              <a:t>11/07/2023</a:t>
+              <a:t>2/08/2023</a:t>
             </a:fld>
             <a:endParaRPr lang="en-AU"/>
           </a:p>
@@ -8192,7 +8202,7 @@
           <a:p>
             <a:fld id="{AFC0772B-B1F5-4297-B0F2-E59C48C63404}" type="datetimeFigureOut">
               <a:rPr lang="en-AU" smtClean="0"/>
-              <a:t>11/07/2023</a:t>
+              <a:t>2/08/2023</a:t>
             </a:fld>
             <a:endParaRPr lang="en-AU"/>
           </a:p>
@@ -8310,7 +8320,7 @@
           <a:p>
             <a:fld id="{AFC0772B-B1F5-4297-B0F2-E59C48C63404}" type="datetimeFigureOut">
               <a:rPr lang="en-AU" smtClean="0"/>
-              <a:t>11/07/2023</a:t>
+              <a:t>2/08/2023</a:t>
             </a:fld>
             <a:endParaRPr lang="en-AU"/>
           </a:p>
@@ -8405,7 +8415,7 @@
           <a:p>
             <a:fld id="{AFC0772B-B1F5-4297-B0F2-E59C48C63404}" type="datetimeFigureOut">
               <a:rPr lang="en-AU" smtClean="0"/>
-              <a:t>11/07/2023</a:t>
+              <a:t>2/08/2023</a:t>
             </a:fld>
             <a:endParaRPr lang="en-AU"/>
           </a:p>
@@ -8654,7 +8664,7 @@
           <a:p>
             <a:fld id="{AFC0772B-B1F5-4297-B0F2-E59C48C63404}" type="datetimeFigureOut">
               <a:rPr lang="en-AU" smtClean="0"/>
-              <a:t>11/07/2023</a:t>
+              <a:t>2/08/2023</a:t>
             </a:fld>
             <a:endParaRPr lang="en-AU"/>
           </a:p>
@@ -8934,7 +8944,7 @@
           <a:p>
             <a:fld id="{AFC0772B-B1F5-4297-B0F2-E59C48C63404}" type="datetimeFigureOut">
               <a:rPr lang="en-AU" smtClean="0"/>
-              <a:t>11/07/2023</a:t>
+              <a:t>2/08/2023</a:t>
             </a:fld>
             <a:endParaRPr lang="en-AU"/>
           </a:p>
@@ -9050,7 +9060,7 @@
           <a:noFill/>
           <a:extLst>
             <a:ext uri="{909E8E84-426E-40dd-AFC4-6F175D3DCCD1}">
-              <a14:hiddenFill xmlns:a14="http://schemas.microsoft.com/office/drawing/2010/main" xmlns="">
+              <a14:hiddenFill xmlns="" xmlns:a14="http://schemas.microsoft.com/office/drawing/2010/main">
                 <a:solidFill>
                   <a:srgbClr val="FFFFFF"/>
                 </a:solidFill>
@@ -9124,7 +9134,7 @@
               </a:ln>
               <a:extLst>
                 <a:ext uri="{91240B29-F687-4f45-9708-019B960494DF}">
-                  <a14:hiddenLine xmlns:a14="http://schemas.microsoft.com/office/drawing/2010/main" xmlns="" w="9525">
+                  <a14:hiddenLine xmlns="" xmlns:a14="http://schemas.microsoft.com/office/drawing/2010/main" w="9525">
                     <a:solidFill>
                       <a:srgbClr val="000000"/>
                     </a:solidFill>
@@ -9214,7 +9224,7 @@
               </a:ln>
               <a:extLst>
                 <a:ext uri="{91240B29-F687-4f45-9708-019B960494DF}">
-                  <a14:hiddenLine xmlns:a14="http://schemas.microsoft.com/office/drawing/2010/main" xmlns="" w="9525">
+                  <a14:hiddenLine xmlns="" xmlns:a14="http://schemas.microsoft.com/office/drawing/2010/main" w="9525">
                     <a:solidFill>
                       <a:srgbClr val="000000"/>
                     </a:solidFill>
@@ -9304,7 +9314,7 @@
               </a:ln>
               <a:extLst>
                 <a:ext uri="{91240B29-F687-4f45-9708-019B960494DF}">
-                  <a14:hiddenLine xmlns:a14="http://schemas.microsoft.com/office/drawing/2010/main" xmlns="" w="9525">
+                  <a14:hiddenLine xmlns="" xmlns:a14="http://schemas.microsoft.com/office/drawing/2010/main" w="9525">
                     <a:solidFill>
                       <a:srgbClr val="000000"/>
                     </a:solidFill>
@@ -9366,7 +9376,7 @@
               </a:ln>
               <a:extLst>
                 <a:ext uri="{91240B29-F687-4f45-9708-019B960494DF}">
-                  <a14:hiddenLine xmlns:a14="http://schemas.microsoft.com/office/drawing/2010/main" xmlns="" w="9525">
+                  <a14:hiddenLine xmlns="" xmlns:a14="http://schemas.microsoft.com/office/drawing/2010/main" w="9525">
                     <a:solidFill>
                       <a:srgbClr val="000000"/>
                     </a:solidFill>
@@ -9456,7 +9466,7 @@
               </a:ln>
               <a:extLst>
                 <a:ext uri="{91240B29-F687-4f45-9708-019B960494DF}">
-                  <a14:hiddenLine xmlns:a14="http://schemas.microsoft.com/office/drawing/2010/main" xmlns="" w="9525">
+                  <a14:hiddenLine xmlns="" xmlns:a14="http://schemas.microsoft.com/office/drawing/2010/main" w="9525">
                     <a:solidFill>
                       <a:srgbClr val="000000"/>
                     </a:solidFill>
@@ -9518,7 +9528,7 @@
               </a:ln>
               <a:extLst>
                 <a:ext uri="{91240B29-F687-4f45-9708-019B960494DF}">
-                  <a14:hiddenLine xmlns:a14="http://schemas.microsoft.com/office/drawing/2010/main" xmlns="" w="9525">
+                  <a14:hiddenLine xmlns="" xmlns:a14="http://schemas.microsoft.com/office/drawing/2010/main" w="9525">
                     <a:solidFill>
                       <a:srgbClr val="000000"/>
                     </a:solidFill>
@@ -9580,7 +9590,7 @@
               </a:ln>
               <a:extLst>
                 <a:ext uri="{91240B29-F687-4f45-9708-019B960494DF}">
-                  <a14:hiddenLine xmlns:a14="http://schemas.microsoft.com/office/drawing/2010/main" xmlns="" w="9525">
+                  <a14:hiddenLine xmlns="" xmlns:a14="http://schemas.microsoft.com/office/drawing/2010/main" w="9525">
                     <a:solidFill>
                       <a:srgbClr val="000000"/>
                     </a:solidFill>
@@ -9670,7 +9680,7 @@
               </a:ln>
               <a:extLst>
                 <a:ext uri="{91240B29-F687-4f45-9708-019B960494DF}">
-                  <a14:hiddenLine xmlns:a14="http://schemas.microsoft.com/office/drawing/2010/main" xmlns="" w="9525">
+                  <a14:hiddenLine xmlns="" xmlns:a14="http://schemas.microsoft.com/office/drawing/2010/main" w="9525">
                     <a:solidFill>
                       <a:srgbClr val="000000"/>
                     </a:solidFill>
@@ -9760,7 +9770,7 @@
               </a:ln>
               <a:extLst>
                 <a:ext uri="{91240B29-F687-4f45-9708-019B960494DF}">
-                  <a14:hiddenLine xmlns:a14="http://schemas.microsoft.com/office/drawing/2010/main" xmlns="" w="9525">
+                  <a14:hiddenLine xmlns="" xmlns:a14="http://schemas.microsoft.com/office/drawing/2010/main" w="9525">
                     <a:solidFill>
                       <a:srgbClr val="000000"/>
                     </a:solidFill>
@@ -9822,7 +9832,7 @@
               </a:ln>
               <a:extLst>
                 <a:ext uri="{91240B29-F687-4f45-9708-019B960494DF}">
-                  <a14:hiddenLine xmlns:a14="http://schemas.microsoft.com/office/drawing/2010/main" xmlns="" w="9525">
+                  <a14:hiddenLine xmlns="" xmlns:a14="http://schemas.microsoft.com/office/drawing/2010/main" w="9525">
                     <a:solidFill>
                       <a:srgbClr val="000000"/>
                     </a:solidFill>
@@ -9932,7 +9942,7 @@
               </a:ln>
               <a:extLst>
                 <a:ext uri="{91240B29-F687-4f45-9708-019B960494DF}">
-                  <a14:hiddenLine xmlns:a14="http://schemas.microsoft.com/office/drawing/2010/main" xmlns="" w="9525">
+                  <a14:hiddenLine xmlns="" xmlns:a14="http://schemas.microsoft.com/office/drawing/2010/main" w="9525">
                     <a:solidFill>
                       <a:srgbClr val="000000"/>
                     </a:solidFill>
@@ -10016,7 +10026,7 @@
               </a:ln>
               <a:extLst>
                 <a:ext uri="{91240B29-F687-4f45-9708-019B960494DF}">
-                  <a14:hiddenLine xmlns:a14="http://schemas.microsoft.com/office/drawing/2010/main" xmlns="" w="9525">
+                  <a14:hiddenLine xmlns="" xmlns:a14="http://schemas.microsoft.com/office/drawing/2010/main" w="9525">
                     <a:solidFill>
                       <a:srgbClr val="000000"/>
                     </a:solidFill>
@@ -10078,7 +10088,7 @@
               </a:ln>
               <a:extLst>
                 <a:ext uri="{91240B29-F687-4f45-9708-019B960494DF}">
-                  <a14:hiddenLine xmlns:a14="http://schemas.microsoft.com/office/drawing/2010/main" xmlns="" w="9525">
+                  <a14:hiddenLine xmlns="" xmlns:a14="http://schemas.microsoft.com/office/drawing/2010/main" w="9525">
                     <a:solidFill>
                       <a:srgbClr val="000000"/>
                     </a:solidFill>
@@ -10140,7 +10150,7 @@
               </a:ln>
               <a:extLst>
                 <a:ext uri="{91240B29-F687-4f45-9708-019B960494DF}">
-                  <a14:hiddenLine xmlns:a14="http://schemas.microsoft.com/office/drawing/2010/main" xmlns="" w="9525">
+                  <a14:hiddenLine xmlns="" xmlns:a14="http://schemas.microsoft.com/office/drawing/2010/main" w="9525">
                     <a:solidFill>
                       <a:srgbClr val="000000"/>
                     </a:solidFill>
@@ -10230,7 +10240,7 @@
               </a:ln>
               <a:extLst>
                 <a:ext uri="{91240B29-F687-4f45-9708-019B960494DF}">
-                  <a14:hiddenLine xmlns:a14="http://schemas.microsoft.com/office/drawing/2010/main" xmlns="" w="9525">
+                  <a14:hiddenLine xmlns="" xmlns:a14="http://schemas.microsoft.com/office/drawing/2010/main" w="9525">
                     <a:solidFill>
                       <a:srgbClr val="000000"/>
                     </a:solidFill>
@@ -10264,7 +10274,7 @@
               </a:ln>
               <a:extLst>
                 <a:ext uri="{91240B29-F687-4f45-9708-019B960494DF}">
-                  <a14:hiddenLine xmlns:a14="http://schemas.microsoft.com/office/drawing/2010/main" xmlns="" w="9525">
+                  <a14:hiddenLine xmlns="" xmlns:a14="http://schemas.microsoft.com/office/drawing/2010/main" w="9525">
                     <a:solidFill>
                       <a:srgbClr val="000000"/>
                     </a:solidFill>
@@ -10329,7 +10339,7 @@
               </a:ln>
               <a:extLst>
                 <a:ext uri="{91240B29-F687-4f45-9708-019B960494DF}">
-                  <a14:hiddenLine xmlns:a14="http://schemas.microsoft.com/office/drawing/2010/main" xmlns="" w="9525">
+                  <a14:hiddenLine xmlns="" xmlns:a14="http://schemas.microsoft.com/office/drawing/2010/main" w="9525">
                     <a:solidFill>
                       <a:srgbClr val="000000"/>
                     </a:solidFill>
@@ -10419,7 +10429,7 @@
               </a:ln>
               <a:extLst>
                 <a:ext uri="{91240B29-F687-4f45-9708-019B960494DF}">
-                  <a14:hiddenLine xmlns:a14="http://schemas.microsoft.com/office/drawing/2010/main" xmlns="" w="9525">
+                  <a14:hiddenLine xmlns="" xmlns:a14="http://schemas.microsoft.com/office/drawing/2010/main" w="9525">
                     <a:solidFill>
                       <a:srgbClr val="000000"/>
                     </a:solidFill>
@@ -10481,7 +10491,7 @@
               </a:ln>
               <a:extLst>
                 <a:ext uri="{91240B29-F687-4f45-9708-019B960494DF}">
-                  <a14:hiddenLine xmlns:a14="http://schemas.microsoft.com/office/drawing/2010/main" xmlns="" w="9525">
+                  <a14:hiddenLine xmlns="" xmlns:a14="http://schemas.microsoft.com/office/drawing/2010/main" w="9525">
                     <a:solidFill>
                       <a:srgbClr val="000000"/>
                     </a:solidFill>
@@ -10571,7 +10581,7 @@
               </a:ln>
               <a:extLst>
                 <a:ext uri="{91240B29-F687-4f45-9708-019B960494DF}">
-                  <a14:hiddenLine xmlns:a14="http://schemas.microsoft.com/office/drawing/2010/main" xmlns="" w="9525">
+                  <a14:hiddenLine xmlns="" xmlns:a14="http://schemas.microsoft.com/office/drawing/2010/main" w="9525">
                     <a:solidFill>
                       <a:srgbClr val="000000"/>
                     </a:solidFill>
@@ -10636,7 +10646,7 @@
               </a:ln>
               <a:extLst>
                 <a:ext uri="{91240B29-F687-4f45-9708-019B960494DF}">
-                  <a14:hiddenLine xmlns:a14="http://schemas.microsoft.com/office/drawing/2010/main" xmlns="" w="9525">
+                  <a14:hiddenLine xmlns="" xmlns:a14="http://schemas.microsoft.com/office/drawing/2010/main" w="9525">
                     <a:solidFill>
                       <a:srgbClr val="000000"/>
                     </a:solidFill>
@@ -10698,7 +10708,7 @@
               </a:ln>
               <a:extLst>
                 <a:ext uri="{91240B29-F687-4f45-9708-019B960494DF}">
-                  <a14:hiddenLine xmlns:a14="http://schemas.microsoft.com/office/drawing/2010/main" xmlns="" w="9525">
+                  <a14:hiddenLine xmlns="" xmlns:a14="http://schemas.microsoft.com/office/drawing/2010/main" w="9525">
                     <a:solidFill>
                       <a:srgbClr val="000000"/>
                     </a:solidFill>
@@ -10788,7 +10798,7 @@
               </a:ln>
               <a:extLst>
                 <a:ext uri="{91240B29-F687-4f45-9708-019B960494DF}">
-                  <a14:hiddenLine xmlns:a14="http://schemas.microsoft.com/office/drawing/2010/main" xmlns="" w="9525">
+                  <a14:hiddenLine xmlns="" xmlns:a14="http://schemas.microsoft.com/office/drawing/2010/main" w="9525">
                     <a:solidFill>
                       <a:srgbClr val="000000"/>
                     </a:solidFill>
@@ -10878,7 +10888,7 @@
               </a:ln>
               <a:extLst>
                 <a:ext uri="{91240B29-F687-4f45-9708-019B960494DF}">
-                  <a14:hiddenLine xmlns:a14="http://schemas.microsoft.com/office/drawing/2010/main" xmlns="" w="9525">
+                  <a14:hiddenLine xmlns="" xmlns:a14="http://schemas.microsoft.com/office/drawing/2010/main" w="9525">
                     <a:solidFill>
                       <a:srgbClr val="000000"/>
                     </a:solidFill>
@@ -10943,7 +10953,7 @@
               </a:ln>
               <a:extLst>
                 <a:ext uri="{91240B29-F687-4f45-9708-019B960494DF}">
-                  <a14:hiddenLine xmlns:a14="http://schemas.microsoft.com/office/drawing/2010/main" xmlns="" w="9525">
+                  <a14:hiddenLine xmlns="" xmlns:a14="http://schemas.microsoft.com/office/drawing/2010/main" w="9525">
                     <a:solidFill>
                       <a:srgbClr val="000000"/>
                     </a:solidFill>
@@ -11063,7 +11073,7 @@
               </a:ln>
               <a:extLst>
                 <a:ext uri="{91240B29-F687-4f45-9708-019B960494DF}">
-                  <a14:hiddenLine xmlns:a14="http://schemas.microsoft.com/office/drawing/2010/main" xmlns="" w="9525">
+                  <a14:hiddenLine xmlns="" xmlns:a14="http://schemas.microsoft.com/office/drawing/2010/main" w="9525">
                     <a:solidFill>
                       <a:srgbClr val="000000"/>
                     </a:solidFill>
@@ -11161,7 +11171,7 @@
               </a:ln>
               <a:extLst>
                 <a:ext uri="{91240B29-F687-4f45-9708-019B960494DF}">
-                  <a14:hiddenLine xmlns:a14="http://schemas.microsoft.com/office/drawing/2010/main" xmlns="" w="9525">
+                  <a14:hiddenLine xmlns="" xmlns:a14="http://schemas.microsoft.com/office/drawing/2010/main" w="9525">
                     <a:solidFill>
                       <a:srgbClr val="000000"/>
                     </a:solidFill>
@@ -11276,7 +11286,7 @@
               </a:ln>
               <a:extLst>
                 <a:ext uri="{91240B29-F687-4f45-9708-019B960494DF}">
-                  <a14:hiddenLine xmlns:a14="http://schemas.microsoft.com/office/drawing/2010/main" xmlns="" w="9525">
+                  <a14:hiddenLine xmlns="" xmlns:a14="http://schemas.microsoft.com/office/drawing/2010/main" w="9525">
                     <a:solidFill>
                       <a:srgbClr val="000000"/>
                     </a:solidFill>
@@ -11366,7 +11376,7 @@
               </a:ln>
               <a:extLst>
                 <a:ext uri="{91240B29-F687-4f45-9708-019B960494DF}">
-                  <a14:hiddenLine xmlns:a14="http://schemas.microsoft.com/office/drawing/2010/main" xmlns="" w="9525">
+                  <a14:hiddenLine xmlns="" xmlns:a14="http://schemas.microsoft.com/office/drawing/2010/main" w="9525">
                     <a:solidFill>
                       <a:srgbClr val="000000"/>
                     </a:solidFill>
@@ -11431,7 +11441,7 @@
               </a:ln>
               <a:extLst>
                 <a:ext uri="{91240B29-F687-4f45-9708-019B960494DF}">
-                  <a14:hiddenLine xmlns:a14="http://schemas.microsoft.com/office/drawing/2010/main" xmlns="" w="9525">
+                  <a14:hiddenLine xmlns="" xmlns:a14="http://schemas.microsoft.com/office/drawing/2010/main" w="9525">
                     <a:solidFill>
                       <a:srgbClr val="000000"/>
                     </a:solidFill>
@@ -11521,7 +11531,7 @@
               </a:ln>
               <a:extLst>
                 <a:ext uri="{91240B29-F687-4f45-9708-019B960494DF}">
-                  <a14:hiddenLine xmlns:a14="http://schemas.microsoft.com/office/drawing/2010/main" xmlns="" w="9525">
+                  <a14:hiddenLine xmlns="" xmlns:a14="http://schemas.microsoft.com/office/drawing/2010/main" w="9525">
                     <a:solidFill>
                       <a:srgbClr val="000000"/>
                     </a:solidFill>
@@ -11589,7 +11599,7 @@
               </a:ln>
               <a:extLst>
                 <a:ext uri="{91240B29-F687-4f45-9708-019B960494DF}">
-                  <a14:hiddenLine xmlns:a14="http://schemas.microsoft.com/office/drawing/2010/main" xmlns="" w="9525">
+                  <a14:hiddenLine xmlns="" xmlns:a14="http://schemas.microsoft.com/office/drawing/2010/main" w="9525">
                     <a:solidFill>
                       <a:srgbClr val="000000"/>
                     </a:solidFill>
@@ -11679,7 +11689,7 @@
               </a:ln>
               <a:extLst>
                 <a:ext uri="{91240B29-F687-4f45-9708-019B960494DF}">
-                  <a14:hiddenLine xmlns:a14="http://schemas.microsoft.com/office/drawing/2010/main" xmlns="" w="9525">
+                  <a14:hiddenLine xmlns="" xmlns:a14="http://schemas.microsoft.com/office/drawing/2010/main" w="9525">
                     <a:solidFill>
                       <a:srgbClr val="000000"/>
                     </a:solidFill>
@@ -11747,7 +11757,7 @@
               </a:ln>
               <a:extLst>
                 <a:ext uri="{91240B29-F687-4f45-9708-019B960494DF}">
-                  <a14:hiddenLine xmlns:a14="http://schemas.microsoft.com/office/drawing/2010/main" xmlns="" w="9525">
+                  <a14:hiddenLine xmlns="" xmlns:a14="http://schemas.microsoft.com/office/drawing/2010/main" w="9525">
                     <a:solidFill>
                       <a:srgbClr val="000000"/>
                     </a:solidFill>
@@ -11837,7 +11847,7 @@
               </a:ln>
               <a:extLst>
                 <a:ext uri="{91240B29-F687-4f45-9708-019B960494DF}">
-                  <a14:hiddenLine xmlns:a14="http://schemas.microsoft.com/office/drawing/2010/main" xmlns="" w="9525">
+                  <a14:hiddenLine xmlns="" xmlns:a14="http://schemas.microsoft.com/office/drawing/2010/main" w="9525">
                     <a:solidFill>
                       <a:srgbClr val="000000"/>
                     </a:solidFill>
@@ -11871,7 +11881,7 @@
               </a:ln>
               <a:extLst>
                 <a:ext uri="{91240B29-F687-4f45-9708-019B960494DF}">
-                  <a14:hiddenLine xmlns:a14="http://schemas.microsoft.com/office/drawing/2010/main" xmlns="" w="9525">
+                  <a14:hiddenLine xmlns="" xmlns:a14="http://schemas.microsoft.com/office/drawing/2010/main" w="9525">
                     <a:solidFill>
                       <a:srgbClr val="000000"/>
                     </a:solidFill>
@@ -12011,7 +12021,7 @@
           <a:p>
             <a:fld id="{AFC0772B-B1F5-4297-B0F2-E59C48C63404}" type="datetimeFigureOut">
               <a:rPr lang="en-AU" smtClean="0"/>
-              <a:t>11/07/2023</a:t>
+              <a:t>2/08/2023</a:t>
             </a:fld>
             <a:endParaRPr lang="en-AU"/>
           </a:p>
@@ -12452,7 +12462,11 @@
           <a:bodyPr/>
           <a:lstStyle/>
           <a:p>
-            <a:endParaRPr lang="en-AU"/>
+            <a:r>
+              <a:rPr lang="en-US" dirty="0"/>
+              <a:t>Video Game Industry Analyses</a:t>
+            </a:r>
+            <a:endParaRPr lang="en-AU" dirty="0"/>
           </a:p>
         </p:txBody>
       </p:sp>
@@ -12477,7 +12491,11 @@
           <a:bodyPr/>
           <a:lstStyle/>
           <a:p>
-            <a:endParaRPr lang="en-AU"/>
+            <a:r>
+              <a:rPr lang="en-US" dirty="0"/>
+              <a:t>By Richard Pountney</a:t>
+            </a:r>
+            <a:endParaRPr lang="en-AU" dirty="0"/>
           </a:p>
         </p:txBody>
       </p:sp>
@@ -12485,6 +12503,606 @@
     <p:extLst>
       <p:ext uri="{BB962C8B-B14F-4D97-AF65-F5344CB8AC3E}">
         <p14:creationId xmlns:p14="http://schemas.microsoft.com/office/powerpoint/2010/main" val="954772907"/>
+      </p:ext>
+    </p:extLst>
+  </p:cSld>
+  <p:clrMapOvr>
+    <a:masterClrMapping/>
+  </p:clrMapOvr>
+</p:sld>
+</file>
+
+<file path=ppt/slides/slide2.xml><?xml version="1.0" encoding="utf-8"?>
+<p:sld xmlns:a="http://schemas.openxmlformats.org/drawingml/2006/main" xmlns:r="http://schemas.openxmlformats.org/officeDocument/2006/relationships" xmlns:p="http://schemas.openxmlformats.org/presentationml/2006/main">
+  <p:cSld>
+    <p:spTree>
+      <p:nvGrpSpPr>
+        <p:cNvPr id="1" name=""/>
+        <p:cNvGrpSpPr/>
+        <p:nvPr/>
+      </p:nvGrpSpPr>
+      <p:grpSpPr>
+        <a:xfrm>
+          <a:off x="0" y="0"/>
+          <a:ext cx="0" cy="0"/>
+          <a:chOff x="0" y="0"/>
+          <a:chExt cx="0" cy="0"/>
+        </a:xfrm>
+      </p:grpSpPr>
+      <p:sp>
+        <p:nvSpPr>
+          <p:cNvPr id="2" name="Title 1">
+            <a:extLst>
+              <a:ext uri="{FF2B5EF4-FFF2-40B4-BE49-F238E27FC236}">
+                <a16:creationId xmlns:a16="http://schemas.microsoft.com/office/drawing/2014/main" id="{2E616363-F497-BDCF-6A96-AE29282375FE}"/>
+              </a:ext>
+            </a:extLst>
+          </p:cNvPr>
+          <p:cNvSpPr>
+            <a:spLocks noGrp="1"/>
+          </p:cNvSpPr>
+          <p:nvPr>
+            <p:ph type="title"/>
+          </p:nvPr>
+        </p:nvSpPr>
+        <p:spPr/>
+        <p:txBody>
+          <a:bodyPr/>
+          <a:lstStyle/>
+          <a:p>
+            <a:pPr algn="ctr"/>
+            <a:r>
+              <a:rPr lang="en-US" dirty="0"/>
+              <a:t>Before the first Gen of home consoles</a:t>
+            </a:r>
+            <a:endParaRPr lang="en-AU" dirty="0"/>
+          </a:p>
+        </p:txBody>
+      </p:sp>
+      <p:sp>
+        <p:nvSpPr>
+          <p:cNvPr id="3" name="Content Placeholder 2">
+            <a:extLst>
+              <a:ext uri="{FF2B5EF4-FFF2-40B4-BE49-F238E27FC236}">
+                <a16:creationId xmlns:a16="http://schemas.microsoft.com/office/drawing/2014/main" id="{CA127AC0-F5D7-D4C2-B683-DEB871EE5278}"/>
+              </a:ext>
+            </a:extLst>
+          </p:cNvPr>
+          <p:cNvSpPr>
+            <a:spLocks noGrp="1"/>
+          </p:cNvSpPr>
+          <p:nvPr>
+            <p:ph idx="1"/>
+          </p:nvPr>
+        </p:nvSpPr>
+        <p:spPr>
+          <a:xfrm>
+            <a:off x="708865" y="2097088"/>
+            <a:ext cx="10771093" cy="4142394"/>
+          </a:xfrm>
+        </p:spPr>
+        <p:txBody>
+          <a:bodyPr>
+            <a:normAutofit lnSpcReduction="10000"/>
+          </a:bodyPr>
+          <a:lstStyle/>
+          <a:p>
+            <a:r>
+              <a:rPr lang="en-US" sz="2000" dirty="0"/>
+              <a:t>There were old fashion PCs that are very primitive compared to modern-day ones.</a:t>
+            </a:r>
+          </a:p>
+          <a:p>
+            <a:r>
+              <a:rPr lang="en-AU" sz="2000" dirty="0"/>
+              <a:t>In 1945 John von Neumann wrote the </a:t>
+            </a:r>
+            <a:r>
+              <a:rPr lang="en-AU" sz="2000" i="1" dirty="0"/>
+              <a:t>First Draft of a Report on the EDVAC</a:t>
+            </a:r>
+          </a:p>
+          <a:p>
+            <a:pPr lvl="1"/>
+            <a:r>
+              <a:rPr lang="en-AU" sz="1800" dirty="0"/>
+              <a:t>He outlines the architecture of a stored-program computer, this included electronic storage of programming data &amp; information. This would eliminate the need for the more clumsy methods of programming such as plugboards, punched cards &amp; paper.</a:t>
+            </a:r>
+          </a:p>
+          <a:p>
+            <a:r>
+              <a:rPr lang="en-AU" sz="2000" dirty="0"/>
+              <a:t>In 1947 The first bug was found</a:t>
+            </a:r>
+          </a:p>
+          <a:p>
+            <a:pPr lvl="1"/>
+            <a:r>
+              <a:rPr lang="en-AU" sz="1800" dirty="0"/>
+              <a:t>Grace Hopper records what she jokingly called the first actual computer bug. This was a moth stuck between relay contacts of the Harvard Mark II.</a:t>
+            </a:r>
+          </a:p>
+          <a:p>
+            <a:pPr lvl="1"/>
+            <a:r>
+              <a:rPr lang="en-AU" sz="1800" dirty="0"/>
+              <a:t>Grace Hopper served on the committee to develop COBOL, which is a standard &amp; widely adopted programming language that had transformed the way software was developed for business applications. COBOL is still used today</a:t>
+            </a:r>
+          </a:p>
+        </p:txBody>
+      </p:sp>
+    </p:spTree>
+    <p:extLst>
+      <p:ext uri="{BB962C8B-B14F-4D97-AF65-F5344CB8AC3E}">
+        <p14:creationId xmlns:p14="http://schemas.microsoft.com/office/powerpoint/2010/main" val="2736236886"/>
+      </p:ext>
+    </p:extLst>
+  </p:cSld>
+  <p:clrMapOvr>
+    <a:masterClrMapping/>
+  </p:clrMapOvr>
+</p:sld>
+</file>
+
+<file path=ppt/slides/slide3.xml><?xml version="1.0" encoding="utf-8"?>
+<p:sld xmlns:a="http://schemas.openxmlformats.org/drawingml/2006/main" xmlns:r="http://schemas.openxmlformats.org/officeDocument/2006/relationships" xmlns:p="http://schemas.openxmlformats.org/presentationml/2006/main">
+  <p:cSld>
+    <p:spTree>
+      <p:nvGrpSpPr>
+        <p:cNvPr id="1" name=""/>
+        <p:cNvGrpSpPr/>
+        <p:nvPr/>
+      </p:nvGrpSpPr>
+      <p:grpSpPr>
+        <a:xfrm>
+          <a:off x="0" y="0"/>
+          <a:ext cx="0" cy="0"/>
+          <a:chOff x="0" y="0"/>
+          <a:chExt cx="0" cy="0"/>
+        </a:xfrm>
+      </p:grpSpPr>
+      <p:sp>
+        <p:nvSpPr>
+          <p:cNvPr id="2" name="Title 1">
+            <a:extLst>
+              <a:ext uri="{FF2B5EF4-FFF2-40B4-BE49-F238E27FC236}">
+                <a16:creationId xmlns:a16="http://schemas.microsoft.com/office/drawing/2014/main" id="{1F23FE7C-F124-6D50-3B3D-47BFC096C168}"/>
+              </a:ext>
+            </a:extLst>
+          </p:cNvPr>
+          <p:cNvSpPr>
+            <a:spLocks noGrp="1"/>
+          </p:cNvSpPr>
+          <p:nvPr>
+            <p:ph type="title"/>
+          </p:nvPr>
+        </p:nvSpPr>
+        <p:spPr/>
+        <p:txBody>
+          <a:bodyPr/>
+          <a:lstStyle/>
+          <a:p>
+            <a:pPr algn="ctr"/>
+            <a:r>
+              <a:rPr lang="en-US" dirty="0"/>
+              <a:t>Before the first Gen of home consoles continued</a:t>
+            </a:r>
+            <a:endParaRPr lang="en-AU" dirty="0"/>
+          </a:p>
+        </p:txBody>
+      </p:sp>
+      <p:sp>
+        <p:nvSpPr>
+          <p:cNvPr id="3" name="Content Placeholder 2">
+            <a:extLst>
+              <a:ext uri="{FF2B5EF4-FFF2-40B4-BE49-F238E27FC236}">
+                <a16:creationId xmlns:a16="http://schemas.microsoft.com/office/drawing/2014/main" id="{E8438207-981F-47ED-0677-0F6ACC76F1F6}"/>
+              </a:ext>
+            </a:extLst>
+          </p:cNvPr>
+          <p:cNvSpPr>
+            <a:spLocks noGrp="1"/>
+          </p:cNvSpPr>
+          <p:nvPr>
+            <p:ph idx="1"/>
+          </p:nvPr>
+        </p:nvSpPr>
+        <p:spPr>
+          <a:xfrm>
+            <a:off x="717176" y="2097088"/>
+            <a:ext cx="10757647" cy="4290265"/>
+          </a:xfrm>
+        </p:spPr>
+        <p:txBody>
+          <a:bodyPr>
+            <a:normAutofit/>
+          </a:bodyPr>
+          <a:lstStyle/>
+          <a:p>
+            <a:r>
+              <a:rPr lang="en-US" sz="2000" dirty="0"/>
+              <a:t>1948 was when the first program to run on a computer happened.</a:t>
+            </a:r>
+          </a:p>
+          <a:p>
+            <a:r>
+              <a:rPr lang="en-AU" sz="2000" dirty="0"/>
+              <a:t>1949 was a big accomplishment in technology, this is because:</a:t>
+            </a:r>
+          </a:p>
+          <a:p>
+            <a:pPr lvl="1"/>
+            <a:r>
+              <a:rPr lang="en-AU" sz="1800" dirty="0"/>
+              <a:t>Magnetic core memory was developed. This was the first reliable high-speed random-access memory (RAM). This was used well into the 1970s.</a:t>
+            </a:r>
+          </a:p>
+          <a:p>
+            <a:pPr lvl="1"/>
+            <a:r>
+              <a:rPr lang="en-AU" sz="1800" dirty="0"/>
+              <a:t>The Electronic Delay Storage Automation Calculator (EDSAC) was constructed &amp; Completed.</a:t>
+            </a:r>
+          </a:p>
+          <a:p>
+            <a:r>
+              <a:rPr lang="en-AU" sz="2000" dirty="0"/>
+              <a:t>In 1952 OXO was made.</a:t>
+            </a:r>
+          </a:p>
+          <a:p>
+            <a:pPr lvl="1"/>
+            <a:r>
+              <a:rPr lang="en-AU" sz="1800" dirty="0"/>
+              <a:t>OXO is a version of tic-tac-toe that was written on the EDSAC.</a:t>
+            </a:r>
+          </a:p>
+          <a:p>
+            <a:pPr lvl="1"/>
+            <a:r>
+              <a:rPr lang="en-AU" sz="1800" dirty="0"/>
+              <a:t>It used rotary telephone dials to enter the moves from the player.</a:t>
+            </a:r>
+          </a:p>
+          <a:p>
+            <a:pPr lvl="1"/>
+            <a:r>
+              <a:rPr lang="en-AU" sz="1800" dirty="0"/>
+              <a:t>The game board display was a 35x15 dot cathode ray tube. </a:t>
+            </a:r>
+          </a:p>
+          <a:p>
+            <a:pPr lvl="1"/>
+            <a:r>
+              <a:rPr lang="en-AU" sz="1800" dirty="0"/>
+              <a:t>The player was able to choose who would make the first move (the player or the machine)</a:t>
+            </a:r>
+          </a:p>
+        </p:txBody>
+      </p:sp>
+    </p:spTree>
+    <p:extLst>
+      <p:ext uri="{BB962C8B-B14F-4D97-AF65-F5344CB8AC3E}">
+        <p14:creationId xmlns:p14="http://schemas.microsoft.com/office/powerpoint/2010/main" val="3223437205"/>
+      </p:ext>
+    </p:extLst>
+  </p:cSld>
+  <p:clrMapOvr>
+    <a:masterClrMapping/>
+  </p:clrMapOvr>
+</p:sld>
+</file>
+
+<file path=ppt/slides/slide4.xml><?xml version="1.0" encoding="utf-8"?>
+<p:sld xmlns:a="http://schemas.openxmlformats.org/drawingml/2006/main" xmlns:r="http://schemas.openxmlformats.org/officeDocument/2006/relationships" xmlns:p="http://schemas.openxmlformats.org/presentationml/2006/main">
+  <p:cSld>
+    <p:spTree>
+      <p:nvGrpSpPr>
+        <p:cNvPr id="1" name=""/>
+        <p:cNvGrpSpPr/>
+        <p:nvPr/>
+      </p:nvGrpSpPr>
+      <p:grpSpPr>
+        <a:xfrm>
+          <a:off x="0" y="0"/>
+          <a:ext cx="0" cy="0"/>
+          <a:chOff x="0" y="0"/>
+          <a:chExt cx="0" cy="0"/>
+        </a:xfrm>
+      </p:grpSpPr>
+      <p:sp>
+        <p:nvSpPr>
+          <p:cNvPr id="2" name="Title 1">
+            <a:extLst>
+              <a:ext uri="{FF2B5EF4-FFF2-40B4-BE49-F238E27FC236}">
+                <a16:creationId xmlns:a16="http://schemas.microsoft.com/office/drawing/2014/main" id="{3CA405E2-1C3D-96F5-48C2-098870C8247C}"/>
+              </a:ext>
+            </a:extLst>
+          </p:cNvPr>
+          <p:cNvSpPr>
+            <a:spLocks noGrp="1"/>
+          </p:cNvSpPr>
+          <p:nvPr>
+            <p:ph type="title"/>
+          </p:nvPr>
+        </p:nvSpPr>
+        <p:spPr/>
+        <p:txBody>
+          <a:bodyPr/>
+          <a:lstStyle/>
+          <a:p>
+            <a:pPr algn="ctr"/>
+            <a:r>
+              <a:rPr lang="en-US" dirty="0"/>
+              <a:t>Before the first Gen of home consoles continued</a:t>
+            </a:r>
+            <a:endParaRPr lang="en-AU" dirty="0"/>
+          </a:p>
+        </p:txBody>
+      </p:sp>
+      <p:sp>
+        <p:nvSpPr>
+          <p:cNvPr id="3" name="Content Placeholder 2">
+            <a:extLst>
+              <a:ext uri="{FF2B5EF4-FFF2-40B4-BE49-F238E27FC236}">
+                <a16:creationId xmlns:a16="http://schemas.microsoft.com/office/drawing/2014/main" id="{C43D3579-F04A-516F-442A-E7EA838A1CFC}"/>
+              </a:ext>
+            </a:extLst>
+          </p:cNvPr>
+          <p:cNvSpPr>
+            <a:spLocks noGrp="1"/>
+          </p:cNvSpPr>
+          <p:nvPr>
+            <p:ph idx="1"/>
+          </p:nvPr>
+        </p:nvSpPr>
+        <p:spPr/>
+        <p:txBody>
+          <a:bodyPr/>
+          <a:lstStyle/>
+          <a:p>
+            <a:r>
+              <a:rPr lang="en-US" dirty="0"/>
+              <a:t>1956 was when research started for Direct keyboard input </a:t>
+            </a:r>
+            <a:r>
+              <a:rPr lang="en-US"/>
+              <a:t>to computers.</a:t>
+            </a:r>
+          </a:p>
+          <a:p>
+            <a:endParaRPr lang="en-AU" dirty="0"/>
+          </a:p>
+        </p:txBody>
+      </p:sp>
+    </p:spTree>
+    <p:extLst>
+      <p:ext uri="{BB962C8B-B14F-4D97-AF65-F5344CB8AC3E}">
+        <p14:creationId xmlns:p14="http://schemas.microsoft.com/office/powerpoint/2010/main" val="1837303944"/>
+      </p:ext>
+    </p:extLst>
+  </p:cSld>
+  <p:clrMapOvr>
+    <a:masterClrMapping/>
+  </p:clrMapOvr>
+</p:sld>
+</file>
+
+<file path=ppt/slides/slide5.xml><?xml version="1.0" encoding="utf-8"?>
+<p:sld xmlns:a="http://schemas.openxmlformats.org/drawingml/2006/main" xmlns:r="http://schemas.openxmlformats.org/officeDocument/2006/relationships" xmlns:p="http://schemas.openxmlformats.org/presentationml/2006/main">
+  <p:cSld>
+    <p:spTree>
+      <p:nvGrpSpPr>
+        <p:cNvPr id="1" name=""/>
+        <p:cNvGrpSpPr/>
+        <p:nvPr/>
+      </p:nvGrpSpPr>
+      <p:grpSpPr>
+        <a:xfrm>
+          <a:off x="0" y="0"/>
+          <a:ext cx="0" cy="0"/>
+          <a:chOff x="0" y="0"/>
+          <a:chExt cx="0" cy="0"/>
+        </a:xfrm>
+      </p:grpSpPr>
+      <p:sp>
+        <p:nvSpPr>
+          <p:cNvPr id="2" name="Title 1">
+            <a:extLst>
+              <a:ext uri="{FF2B5EF4-FFF2-40B4-BE49-F238E27FC236}">
+                <a16:creationId xmlns:a16="http://schemas.microsoft.com/office/drawing/2014/main" id="{6F28F636-F36A-487D-AE5E-E593374D1DAB}"/>
+              </a:ext>
+            </a:extLst>
+          </p:cNvPr>
+          <p:cNvSpPr>
+            <a:spLocks noGrp="1"/>
+          </p:cNvSpPr>
+          <p:nvPr>
+            <p:ph type="title"/>
+          </p:nvPr>
+        </p:nvSpPr>
+        <p:spPr/>
+        <p:txBody>
+          <a:bodyPr/>
+          <a:lstStyle/>
+          <a:p>
+            <a:endParaRPr lang="en-AU"/>
+          </a:p>
+        </p:txBody>
+      </p:sp>
+      <p:sp>
+        <p:nvSpPr>
+          <p:cNvPr id="3" name="Content Placeholder 2">
+            <a:extLst>
+              <a:ext uri="{FF2B5EF4-FFF2-40B4-BE49-F238E27FC236}">
+                <a16:creationId xmlns:a16="http://schemas.microsoft.com/office/drawing/2014/main" id="{A90EF152-CB89-4A3B-2464-0B49175F153D}"/>
+              </a:ext>
+            </a:extLst>
+          </p:cNvPr>
+          <p:cNvSpPr>
+            <a:spLocks noGrp="1"/>
+          </p:cNvSpPr>
+          <p:nvPr>
+            <p:ph idx="1"/>
+          </p:nvPr>
+        </p:nvSpPr>
+        <p:spPr/>
+        <p:txBody>
+          <a:bodyPr/>
+          <a:lstStyle/>
+          <a:p>
+            <a:endParaRPr lang="en-AU"/>
+          </a:p>
+        </p:txBody>
+      </p:sp>
+    </p:spTree>
+    <p:extLst>
+      <p:ext uri="{BB962C8B-B14F-4D97-AF65-F5344CB8AC3E}">
+        <p14:creationId xmlns:p14="http://schemas.microsoft.com/office/powerpoint/2010/main" val="3814947296"/>
+      </p:ext>
+    </p:extLst>
+  </p:cSld>
+  <p:clrMapOvr>
+    <a:masterClrMapping/>
+  </p:clrMapOvr>
+</p:sld>
+</file>
+
+<file path=ppt/slides/slide6.xml><?xml version="1.0" encoding="utf-8"?>
+<p:sld xmlns:a="http://schemas.openxmlformats.org/drawingml/2006/main" xmlns:r="http://schemas.openxmlformats.org/officeDocument/2006/relationships" xmlns:p="http://schemas.openxmlformats.org/presentationml/2006/main">
+  <p:cSld>
+    <p:spTree>
+      <p:nvGrpSpPr>
+        <p:cNvPr id="1" name=""/>
+        <p:cNvGrpSpPr/>
+        <p:nvPr/>
+      </p:nvGrpSpPr>
+      <p:grpSpPr>
+        <a:xfrm>
+          <a:off x="0" y="0"/>
+          <a:ext cx="0" cy="0"/>
+          <a:chOff x="0" y="0"/>
+          <a:chExt cx="0" cy="0"/>
+        </a:xfrm>
+      </p:grpSpPr>
+      <p:sp>
+        <p:nvSpPr>
+          <p:cNvPr id="2" name="Title 1">
+            <a:extLst>
+              <a:ext uri="{FF2B5EF4-FFF2-40B4-BE49-F238E27FC236}">
+                <a16:creationId xmlns:a16="http://schemas.microsoft.com/office/drawing/2014/main" id="{DB0253E5-BBF5-0885-0DFE-4F3F8C552DEE}"/>
+              </a:ext>
+            </a:extLst>
+          </p:cNvPr>
+          <p:cNvSpPr>
+            <a:spLocks noGrp="1"/>
+          </p:cNvSpPr>
+          <p:nvPr>
+            <p:ph type="title"/>
+          </p:nvPr>
+        </p:nvSpPr>
+        <p:spPr/>
+        <p:txBody>
+          <a:bodyPr/>
+          <a:lstStyle/>
+          <a:p>
+            <a:r>
+              <a:rPr lang="en-US" dirty="0"/>
+              <a:t>References for information.</a:t>
+            </a:r>
+            <a:endParaRPr lang="en-AU" dirty="0"/>
+          </a:p>
+        </p:txBody>
+      </p:sp>
+      <p:sp>
+        <p:nvSpPr>
+          <p:cNvPr id="3" name="Content Placeholder 2">
+            <a:extLst>
+              <a:ext uri="{FF2B5EF4-FFF2-40B4-BE49-F238E27FC236}">
+                <a16:creationId xmlns:a16="http://schemas.microsoft.com/office/drawing/2014/main" id="{3EB98CB3-DDC1-226F-DE8D-AC5126187C12}"/>
+              </a:ext>
+            </a:extLst>
+          </p:cNvPr>
+          <p:cNvSpPr>
+            <a:spLocks noGrp="1"/>
+          </p:cNvSpPr>
+          <p:nvPr>
+            <p:ph idx="1"/>
+          </p:nvPr>
+        </p:nvSpPr>
+        <p:spPr/>
+        <p:txBody>
+          <a:bodyPr/>
+          <a:lstStyle/>
+          <a:p>
+            <a:r>
+              <a:rPr lang="en-US" dirty="0"/>
+              <a:t>Before the first gen of home consoles:</a:t>
+            </a:r>
+          </a:p>
+          <a:p>
+            <a:pPr lvl="1"/>
+            <a:r>
+              <a:rPr lang="en-AU" dirty="0">
+                <a:hlinkClick r:id="rId2"/>
+              </a:rPr>
+              <a:t>https://www.computerhistory.org/timeline/1945/</a:t>
+            </a:r>
+            <a:r>
+              <a:rPr lang="en-US" dirty="0"/>
+              <a:t> </a:t>
+            </a:r>
+          </a:p>
+          <a:p>
+            <a:pPr lvl="1"/>
+            <a:r>
+              <a:rPr lang="en-AU" dirty="0">
+                <a:hlinkClick r:id="rId3"/>
+              </a:rPr>
+              <a:t>https://www.computerhistory.org/timeline/1947/</a:t>
+            </a:r>
+            <a:endParaRPr lang="en-US" dirty="0"/>
+          </a:p>
+          <a:p>
+            <a:pPr lvl="1"/>
+            <a:r>
+              <a:rPr lang="en-AU" dirty="0">
+                <a:hlinkClick r:id="rId4"/>
+              </a:rPr>
+              <a:t>https://www.computerhistory.org/timeline/1948/</a:t>
+            </a:r>
+            <a:endParaRPr lang="en-AU" dirty="0"/>
+          </a:p>
+          <a:p>
+            <a:pPr lvl="1"/>
+            <a:r>
+              <a:rPr lang="en-AU" dirty="0">
+                <a:hlinkClick r:id="rId5"/>
+              </a:rPr>
+              <a:t>https://www.computerhistory.org/timeline/1949/</a:t>
+            </a:r>
+            <a:endParaRPr lang="en-AU" dirty="0"/>
+          </a:p>
+          <a:p>
+            <a:pPr lvl="1"/>
+            <a:r>
+              <a:rPr lang="en-AU" dirty="0">
+                <a:hlinkClick r:id="rId6"/>
+              </a:rPr>
+              <a:t>https://www.computerhistory.org/timeline/1952/</a:t>
+            </a:r>
+            <a:endParaRPr lang="en-AU" dirty="0"/>
+          </a:p>
+          <a:p>
+            <a:pPr lvl="1"/>
+            <a:endParaRPr lang="en-AU" dirty="0"/>
+          </a:p>
+        </p:txBody>
+      </p:sp>
+    </p:spTree>
+    <p:extLst>
+      <p:ext uri="{BB962C8B-B14F-4D97-AF65-F5344CB8AC3E}">
+        <p14:creationId xmlns:p14="http://schemas.microsoft.com/office/powerpoint/2010/main" val="58049170"/>
       </p:ext>
     </p:extLst>
   </p:cSld>

</xml_diff>